<commit_message>
Updates to presentation / Class Guide
</commit_message>
<xml_diff>
--- a/presentation/Class_3_Functions_Why_and_How/Class_3_Functions_Why_and_How.pptx
+++ b/presentation/Class_3_Functions_Why_and_How/Class_3_Functions_Why_and_How.pptx
@@ -127,6 +127,9 @@
     <p:ext uri="{EFAFB233-063F-42B5-8137-9DF3F51BA10A}">
       <p15:sldGuideLst xmlns:p15="http://schemas.microsoft.com/office/powerpoint/2012/main"/>
     </p:ext>
+    <p:ext uri="{2D200454-40CA-4A62-9FC3-DE9A4176ACB9}">
+      <p15:notesGuideLst xmlns:p15="http://schemas.microsoft.com/office/powerpoint/2012/main"/>
+    </p:ext>
   </p:extLst>
 </p:presentation>
 </file>
@@ -225,7 +228,7 @@
           <a:p>
             <a:fld id="{2F2D3CE1-F05B-4C3D-9D5C-72AEEB268A38}" type="datetimeFigureOut">
               <a:rPr lang="en-US" smtClean="0"/>
-              <a:t>7/3/2022</a:t>
+              <a:t>7/13/2022</a:t>
             </a:fld>
             <a:endParaRPr lang="en-US"/>
           </a:p>
@@ -402,7 +405,7 @@
           <a:p>
             <a:fld id="{13370B23-86E2-4053-8EEB-332AC694C455}" type="datetimeFigureOut">
               <a:rPr lang="en-US" smtClean="0"/>
-              <a:t>7/3/2022</a:t>
+              <a:t>7/13/2022</a:t>
             </a:fld>
             <a:endParaRPr lang="en-US"/>
           </a:p>
@@ -833,7 +836,7 @@
                 <a:tabLst/>
                 <a:defRPr/>
               </a:pPr>
-              <a:t>7/3/2022</a:t>
+              <a:t>7/13/2022</a:t>
             </a:fld>
             <a:endParaRPr kumimoji="0" lang="en-US" sz="1200" b="0" i="0" u="none" strike="noStrike" kern="1200" cap="none" spc="0" normalizeH="0" baseline="0" noProof="0" dirty="0">
               <a:ln>
@@ -1189,7 +1192,7 @@
                 <a:tabLst/>
                 <a:defRPr/>
               </a:pPr>
-              <a:t>7/3/2022</a:t>
+              <a:t>7/13/2022</a:t>
             </a:fld>
             <a:endParaRPr kumimoji="0" lang="en-US" sz="1200" b="0" i="0" u="none" strike="noStrike" kern="1200" cap="none" spc="0" normalizeH="0" baseline="0" noProof="0" dirty="0">
               <a:ln>
@@ -1538,7 +1541,7 @@
                 <a:tabLst/>
                 <a:defRPr/>
               </a:pPr>
-              <a:t>7/3/2022</a:t>
+              <a:t>7/13/2022</a:t>
             </a:fld>
             <a:endParaRPr kumimoji="0" lang="en-US" sz="1200" b="0" i="0" u="none" strike="noStrike" kern="1200" cap="none" spc="0" normalizeH="0" baseline="0" noProof="0" dirty="0">
               <a:ln>
@@ -1884,7 +1887,7 @@
                 <a:tabLst/>
                 <a:defRPr/>
               </a:pPr>
-              <a:t>7/3/2022</a:t>
+              <a:t>7/13/2022</a:t>
             </a:fld>
             <a:endParaRPr kumimoji="0" lang="en-US" sz="1200" b="0" i="0" u="none" strike="noStrike" kern="1200" cap="none" spc="0" normalizeH="0" baseline="0" noProof="0" dirty="0">
               <a:ln>
@@ -2215,7 +2218,7 @@
                 <a:tabLst/>
                 <a:defRPr/>
               </a:pPr>
-              <a:t>7/3/2022</a:t>
+              <a:t>7/13/2022</a:t>
             </a:fld>
             <a:endParaRPr kumimoji="0" lang="en-US" sz="1200" b="0" i="0" u="none" strike="noStrike" kern="1200" cap="none" spc="0" normalizeH="0" baseline="0" noProof="0" dirty="0">
               <a:ln>
@@ -2555,7 +2558,7 @@
                 <a:tabLst/>
                 <a:defRPr/>
               </a:pPr>
-              <a:t>7/3/2022</a:t>
+              <a:t>7/13/2022</a:t>
             </a:fld>
             <a:endParaRPr kumimoji="0" lang="en-US" sz="1200" b="0" i="0" u="none" strike="noStrike" kern="1200" cap="none" spc="0" normalizeH="0" baseline="0" noProof="0" dirty="0">
               <a:ln>
@@ -2895,7 +2898,7 @@
                 <a:tabLst/>
                 <a:defRPr/>
               </a:pPr>
-              <a:t>7/3/2022</a:t>
+              <a:t>7/13/2022</a:t>
             </a:fld>
             <a:endParaRPr kumimoji="0" lang="en-US" sz="1200" b="0" i="0" u="none" strike="noStrike" kern="1200" cap="none" spc="0" normalizeH="0" baseline="0" noProof="0" dirty="0">
               <a:ln>
@@ -3235,7 +3238,7 @@
                 <a:tabLst/>
                 <a:defRPr/>
               </a:pPr>
-              <a:t>7/3/2022</a:t>
+              <a:t>7/13/2022</a:t>
             </a:fld>
             <a:endParaRPr kumimoji="0" lang="en-US" sz="1200" b="0" i="0" u="none" strike="noStrike" kern="1200" cap="none" spc="0" normalizeH="0" baseline="0" noProof="0" dirty="0">
               <a:ln>
@@ -3575,7 +3578,7 @@
                 <a:tabLst/>
                 <a:defRPr/>
               </a:pPr>
-              <a:t>7/3/2022</a:t>
+              <a:t>7/13/2022</a:t>
             </a:fld>
             <a:endParaRPr kumimoji="0" lang="en-US" sz="1200" b="0" i="0" u="none" strike="noStrike" kern="1200" cap="none" spc="0" normalizeH="0" baseline="0" noProof="0" dirty="0">
               <a:ln>
@@ -3909,7 +3912,7 @@
                 <a:tabLst/>
                 <a:defRPr/>
               </a:pPr>
-              <a:t>7/3/2022</a:t>
+              <a:t>7/13/2022</a:t>
             </a:fld>
             <a:endParaRPr kumimoji="0" lang="en-US" sz="1200" b="0" i="0" u="none" strike="noStrike" kern="1200" cap="none" spc="0" normalizeH="0" baseline="0" noProof="0" dirty="0">
               <a:ln>
@@ -4265,7 +4268,7 @@
                 <a:tabLst/>
                 <a:defRPr/>
               </a:pPr>
-              <a:t>7/3/2022</a:t>
+              <a:t>7/13/2022</a:t>
             </a:fld>
             <a:endParaRPr kumimoji="0" lang="en-US" sz="1200" b="0" i="0" u="none" strike="noStrike" kern="1200" cap="none" spc="0" normalizeH="0" baseline="0" noProof="0" dirty="0">
               <a:ln>
@@ -5154,7 +5157,7 @@
           <a:p>
             <a:fld id="{B1DF5501-EE91-4443-9D3B-24E6F28D34E2}" type="datetime1">
               <a:rPr lang="en-US" smtClean="0"/>
-              <a:t>7/3/2022</a:t>
+              <a:t>7/13/2022</a:t>
             </a:fld>
             <a:endParaRPr lang="en-US" dirty="0"/>
           </a:p>
@@ -5428,7 +5431,7 @@
           <a:p>
             <a:fld id="{E954E1E9-8456-43AD-BA28-861520D256B9}" type="datetime1">
               <a:rPr lang="en-US" smtClean="0"/>
-              <a:t>7/3/2022</a:t>
+              <a:t>7/13/2022</a:t>
             </a:fld>
             <a:endParaRPr lang="en-US" dirty="0"/>
           </a:p>
@@ -5754,7 +5757,7 @@
           <a:p>
             <a:fld id="{FAF31E0C-AAFD-4E63-B3AE-16CD757951F4}" type="datetime1">
               <a:rPr lang="en-US" smtClean="0"/>
-              <a:t>7/3/2022</a:t>
+              <a:t>7/13/2022</a:t>
             </a:fld>
             <a:endParaRPr lang="en-US" dirty="0"/>
           </a:p>
@@ -6107,7 +6110,7 @@
           <a:p>
             <a:fld id="{000084FF-4715-4B6E-BD22-453621E5873F}" type="datetime1">
               <a:rPr lang="en-US" smtClean="0"/>
-              <a:t>7/3/2022</a:t>
+              <a:t>7/13/2022</a:t>
             </a:fld>
             <a:endParaRPr lang="en-US" dirty="0"/>
           </a:p>
@@ -6433,7 +6436,7 @@
           <a:p>
             <a:fld id="{6AC37F8D-4DF5-4AB6-A766-5A84B3D74A3B}" type="datetime1">
               <a:rPr lang="en-US" smtClean="0"/>
-              <a:t>7/3/2022</a:t>
+              <a:t>7/13/2022</a:t>
             </a:fld>
             <a:endParaRPr lang="en-US" dirty="0"/>
           </a:p>
@@ -6838,7 +6841,7 @@
           <a:p>
             <a:fld id="{1BF3CD1A-162D-40B2-9B22-9056F77C27F2}" type="datetime1">
               <a:rPr lang="en-US" smtClean="0"/>
-              <a:t>7/3/2022</a:t>
+              <a:t>7/13/2022</a:t>
             </a:fld>
             <a:endParaRPr lang="en-US" dirty="0"/>
           </a:p>
@@ -7020,7 +7023,7 @@
           <a:p>
             <a:fld id="{D42E4200-B1E5-4E39-8279-05DD69810A37}" type="datetime1">
               <a:rPr lang="en-US" smtClean="0"/>
-              <a:t>7/3/2022</a:t>
+              <a:t>7/13/2022</a:t>
             </a:fld>
             <a:endParaRPr lang="en-US" dirty="0"/>
           </a:p>
@@ -7211,7 +7214,7 @@
           <a:p>
             <a:fld id="{47CF7895-00AC-42E5-9790-7B0E3CE09DF2}" type="datetime1">
               <a:rPr lang="en-US" smtClean="0"/>
-              <a:t>7/3/2022</a:t>
+              <a:t>7/13/2022</a:t>
             </a:fld>
             <a:endParaRPr lang="en-US" dirty="0"/>
           </a:p>
@@ -7402,7 +7405,7 @@
           <a:p>
             <a:fld id="{059A67F1-3EA0-4026-BE6A-31EE4E1B1DB5}" type="datetime1">
               <a:rPr lang="en-US" smtClean="0"/>
-              <a:t>7/3/2022</a:t>
+              <a:t>7/13/2022</a:t>
             </a:fld>
             <a:endParaRPr lang="en-US" dirty="0"/>
           </a:p>
@@ -7686,7 +7689,7 @@
           <a:p>
             <a:fld id="{3F9A13D6-B8C2-463B-B3F7-C62E098B328E}" type="datetime1">
               <a:rPr lang="en-US" smtClean="0"/>
-              <a:t>7/3/2022</a:t>
+              <a:t>7/13/2022</a:t>
             </a:fld>
             <a:endParaRPr lang="en-US" dirty="0"/>
           </a:p>
@@ -7929,7 +7932,7 @@
           <a:p>
             <a:fld id="{D2B63420-31EE-4E4B-911C-2601B14D9FDD}" type="datetime1">
               <a:rPr lang="en-US" smtClean="0"/>
-              <a:t>7/3/2022</a:t>
+              <a:t>7/13/2022</a:t>
             </a:fld>
             <a:endParaRPr lang="en-US" dirty="0"/>
           </a:p>
@@ -8314,7 +8317,7 @@
           <a:p>
             <a:fld id="{2DD8986D-86F8-41E6-8CFF-8C91AEF92622}" type="datetime1">
               <a:rPr lang="en-US" smtClean="0"/>
-              <a:t>7/3/2022</a:t>
+              <a:t>7/13/2022</a:t>
             </a:fld>
             <a:endParaRPr lang="en-US" dirty="0"/>
           </a:p>
@@ -8448,7 +8451,7 @@
           <a:p>
             <a:fld id="{BA885161-032E-4C6A-8EDA-39D168DF18E4}" type="datetime1">
               <a:rPr lang="en-US" smtClean="0"/>
-              <a:t>7/3/2022</a:t>
+              <a:t>7/13/2022</a:t>
             </a:fld>
             <a:endParaRPr lang="en-US" dirty="0"/>
           </a:p>
@@ -8554,7 +8557,7 @@
           <a:p>
             <a:fld id="{958E6740-E523-48D9-9C4E-6F218E87BAF3}" type="datetime1">
               <a:rPr lang="en-US" smtClean="0"/>
-              <a:t>7/3/2022</a:t>
+              <a:t>7/13/2022</a:t>
             </a:fld>
             <a:endParaRPr lang="en-US" dirty="0"/>
           </a:p>
@@ -8820,7 +8823,7 @@
           <a:p>
             <a:fld id="{6121D4CA-FF09-4CB8-8D51-2613D19A0F2E}" type="datetime1">
               <a:rPr lang="en-US" smtClean="0"/>
-              <a:t>7/3/2022</a:t>
+              <a:t>7/13/2022</a:t>
             </a:fld>
             <a:endParaRPr lang="en-US" dirty="0"/>
           </a:p>
@@ -9093,7 +9096,7 @@
           <a:p>
             <a:fld id="{8C4779EA-AEA7-43B3-9B65-A77E9A890421}" type="datetime1">
               <a:rPr lang="en-US" smtClean="0"/>
-              <a:t>7/3/2022</a:t>
+              <a:t>7/13/2022</a:t>
             </a:fld>
             <a:endParaRPr lang="en-US" dirty="0"/>
           </a:p>
@@ -9846,7 +9849,7 @@
           <a:p>
             <a:fld id="{059A67F1-3EA0-4026-BE6A-31EE4E1B1DB5}" type="datetime1">
               <a:rPr lang="en-US" smtClean="0"/>
-              <a:t>7/3/2022</a:t>
+              <a:t>7/13/2022</a:t>
             </a:fld>
             <a:endParaRPr lang="en-US" dirty="0"/>
           </a:p>
@@ -10623,7 +10626,7 @@
                 <a:tabLst/>
                 <a:defRPr/>
               </a:pPr>
-              <a:t>7/3/2022</a:t>
+              <a:t>7/13/2022</a:t>
             </a:fld>
             <a:endParaRPr kumimoji="0" lang="en-US" sz="900" b="0" i="0" u="none" strike="noStrike" kern="1200" cap="none" spc="0" normalizeH="0" baseline="0" noProof="0" dirty="0">
               <a:ln>
@@ -11267,7 +11270,7 @@
                 <a:tabLst/>
                 <a:defRPr/>
               </a:pPr>
-              <a:t>7/3/2022</a:t>
+              <a:t>7/13/2022</a:t>
             </a:fld>
             <a:endParaRPr kumimoji="0" lang="en-US" sz="900" b="0" i="0" u="none" strike="noStrike" kern="1200" cap="none" spc="0" normalizeH="0" baseline="0" noProof="0" dirty="0">
               <a:ln>
@@ -11655,7 +11658,7 @@
                 <a:tabLst/>
                 <a:defRPr/>
               </a:pPr>
-              <a:t>7/3/2022</a:t>
+              <a:t>7/13/2022</a:t>
             </a:fld>
             <a:endParaRPr kumimoji="0" lang="en-US" sz="900" b="0" i="0" u="none" strike="noStrike" kern="1200" cap="none" spc="0" normalizeH="0" baseline="0" noProof="0" dirty="0">
               <a:ln>
@@ -11900,7 +11903,7 @@
           <a:p>
             <a:r>
               <a:rPr lang="en-US" dirty="0"/>
-              <a:t>Get some bounce!</a:t>
+              <a:t>Get some bounce – a closer look</a:t>
             </a:r>
           </a:p>
         </p:txBody>
@@ -11970,7 +11973,7 @@
           <a:p>
             <a:fld id="{A7119916-CD40-456D-ABE3-55F8822671F7}" type="datetime1">
               <a:rPr lang="en-US" smtClean="0"/>
-              <a:t>7/3/2022</a:t>
+              <a:t>7/13/2022</a:t>
             </a:fld>
             <a:endParaRPr lang="en-US" dirty="0"/>
           </a:p>
@@ -12097,7 +12100,7 @@
           <a:p>
             <a:r>
               <a:rPr lang="en-US" dirty="0"/>
-              <a:t>Bouncing Plan</a:t>
+              <a:t>Bouncing Ball Plan</a:t>
             </a:r>
           </a:p>
         </p:txBody>
@@ -12322,7 +12325,7 @@
           <a:p>
             <a:fld id="{A7119916-CD40-456D-ABE3-55F8822671F7}" type="datetime1">
               <a:rPr lang="en-US" smtClean="0"/>
-              <a:t>7/3/2022</a:t>
+              <a:t>7/13/2022</a:t>
             </a:fld>
             <a:endParaRPr lang="en-US" dirty="0"/>
           </a:p>
@@ -12538,7 +12541,7 @@
                 <a:tabLst/>
                 <a:defRPr/>
               </a:pPr>
-              <a:t>7/3/2022</a:t>
+              <a:t>7/13/2022</a:t>
             </a:fld>
             <a:endParaRPr kumimoji="0" lang="en-US" sz="900" b="0" i="0" u="none" strike="noStrike" kern="1200" cap="none" spc="0" normalizeH="0" baseline="0" noProof="0" dirty="0">
               <a:ln>
@@ -12771,7 +12774,7 @@
           <a:p>
             <a:r>
               <a:rPr lang="en-US" dirty="0"/>
-              <a:t>Functions Samples</a:t>
+              <a:t>Overall View Samples</a:t>
             </a:r>
           </a:p>
         </p:txBody>
@@ -12794,31 +12797,31 @@
         </p:nvSpPr>
         <p:spPr/>
         <p:txBody>
-          <a:bodyPr/>
-          <a:lstStyle/>
-          <a:p>
-            <a:r>
-              <a:rPr lang="en-US" sz="2800" dirty="0"/>
-              <a:t>samples/</a:t>
-            </a:r>
-          </a:p>
-          <a:p>
-            <a:pPr lvl="1"/>
-            <a:r>
-              <a:rPr lang="en-US" sz="2600" dirty="0"/>
-              <a:t>shapes.py – function - points to lines to letters</a:t>
-            </a:r>
-          </a:p>
-          <a:p>
-            <a:pPr lvl="1"/>
-            <a:r>
-              <a:rPr lang="en-US" sz="2600" dirty="0"/>
-              <a:t>shapes_around_text.py – adding text to drawing</a:t>
-            </a:r>
-          </a:p>
-          <a:p>
-            <a:pPr lvl="1"/>
-            <a:endParaRPr lang="en-US" dirty="0"/>
+          <a:bodyPr>
+            <a:normAutofit/>
+          </a:bodyPr>
+          <a:lstStyle/>
+          <a:p>
+            <a:pPr marL="457200" lvl="1" indent="0">
+              <a:buNone/>
+            </a:pPr>
+            <a:r>
+              <a:rPr lang="en-US" sz="3600" dirty="0">
+                <a:solidFill>
+                  <a:schemeClr val="accent1"/>
+                </a:solidFill>
+              </a:rPr>
+              <a:t>Animation / control</a:t>
+            </a:r>
+          </a:p>
+          <a:p>
+            <a:pPr marL="457200" lvl="1" indent="0" algn="ctr">
+              <a:buNone/>
+            </a:pPr>
+            <a:r>
+              <a:rPr lang="en-US" sz="3600" dirty="0"/>
+              <a:t>bouncing_balls.py</a:t>
+            </a:r>
           </a:p>
         </p:txBody>
       </p:sp>
@@ -12850,7 +12853,7 @@
           <a:p>
             <a:fld id="{A7119916-CD40-456D-ABE3-55F8822671F7}" type="datetime1">
               <a:rPr lang="en-US" smtClean="0"/>
-              <a:t>7/3/2022</a:t>
+              <a:t>7/13/2022</a:t>
             </a:fld>
             <a:endParaRPr lang="en-US" dirty="0"/>
           </a:p>
@@ -13181,7 +13184,7 @@
                 <a:tabLst/>
                 <a:defRPr/>
               </a:pPr>
-              <a:t>7/3/2022</a:t>
+              <a:t>7/13/2022</a:t>
             </a:fld>
             <a:endParaRPr kumimoji="0" lang="en-US" sz="900" b="0" i="0" u="none" strike="noStrike" kern="1200" cap="none" spc="0" normalizeH="0" baseline="0" noProof="0" dirty="0">
               <a:ln>
@@ -13718,7 +13721,7 @@
                 <a:tabLst/>
                 <a:defRPr/>
               </a:pPr>
-              <a:t>7/3/2022</a:t>
+              <a:t>7/13/2022</a:t>
             </a:fld>
             <a:endParaRPr kumimoji="0" lang="en-US" sz="900" b="0" i="0" u="none" strike="noStrike" kern="1200" cap="none" spc="0" normalizeH="0" baseline="0" noProof="0" dirty="0">
               <a:ln>
@@ -14155,7 +14158,7 @@
                 <a:tabLst/>
                 <a:defRPr/>
               </a:pPr>
-              <a:t>7/3/2022</a:t>
+              <a:t>7/13/2022</a:t>
             </a:fld>
             <a:endParaRPr kumimoji="0" lang="en-US" sz="900" b="0" i="0" u="none" strike="noStrike" kern="1200" cap="none" spc="0" normalizeH="0" baseline="0" noProof="0" dirty="0">
               <a:ln>
@@ -14400,6 +14403,7 @@
           </a:bodyPr>
           <a:lstStyle/>
           <a:p>
+            <a:pPr algn="ctr"/>
             <a:r>
               <a:rPr lang="en-US" dirty="0"/>
               <a:t>Functions - </a:t>
@@ -14421,6 +14425,22 @@
               </a:rPr>
               <a:t>a Simple path to modules</a:t>
             </a:r>
+            <a:br>
+              <a:rPr kumimoji="0" lang="en-US" sz="3200" b="0" i="0" u="none" strike="noStrike" kern="1200" cap="none" spc="0" normalizeH="0" baseline="0" noProof="0" dirty="0">
+                <a:ln>
+                  <a:noFill/>
+                </a:ln>
+                <a:solidFill>
+                  <a:srgbClr val="90C226"/>
+                </a:solidFill>
+                <a:effectLst/>
+                <a:uLnTx/>
+                <a:uFillTx/>
+                <a:latin typeface="Trebuchet MS" panose="020B0603020202020204"/>
+                <a:ea typeface="+mj-ea"/>
+                <a:cs typeface="+mj-cs"/>
+              </a:rPr>
+            </a:br>
             <a:endParaRPr lang="en-US" sz="3200" dirty="0"/>
           </a:p>
         </p:txBody>
@@ -14646,7 +14666,7 @@
                 <a:tabLst/>
                 <a:defRPr/>
               </a:pPr>
-              <a:t>7/3/2022</a:t>
+              <a:t>7/13/2022</a:t>
             </a:fld>
             <a:endParaRPr kumimoji="0" lang="en-US" sz="900" b="0" i="0" u="none" strike="noStrike" kern="1200" cap="none" spc="0" normalizeH="0" baseline="0" noProof="0" dirty="0">
               <a:ln>
@@ -14836,13 +14856,13 @@
   <p:clrMapOvr>
     <a:masterClrMapping/>
   </p:clrMapOvr>
-  <mc:AlternateContent xmlns:mc="http://schemas.openxmlformats.org/markup-compatibility/2006">
-    <mc:Choice xmlns:p14="http://schemas.microsoft.com/office/powerpoint/2010/main" Requires="p14">
+  <mc:AlternateContent xmlns:mc="http://schemas.openxmlformats.org/markup-compatibility/2006" xmlns:p14="http://schemas.microsoft.com/office/powerpoint/2010/main">
+    <mc:Choice Requires="p14">
       <p:transition spd="med" p14:dur="700">
         <p:fade/>
       </p:transition>
     </mc:Choice>
-    <mc:Fallback>
+    <mc:Fallback xmlns="">
       <p:transition spd="med">
         <p:fade/>
       </p:transition>
@@ -14950,7 +14970,60 @@
                 <a:latin typeface="+mj-lt"/>
                 <a:cs typeface="Courier New" panose="02070309020205020404" pitchFamily="49" charset="0"/>
               </a:rPr>
-              <a:t>f. Expand friends module</a:t>
+              <a:t>f. Expand friends module: friends_mod.py</a:t>
+            </a:r>
+          </a:p>
+          <a:p>
+            <a:pPr marL="1714500" lvl="3" indent="-457200"/>
+            <a:r>
+              <a:rPr lang="en-US" sz="2800" dirty="0">
+                <a:solidFill>
+                  <a:schemeClr val="accent1"/>
+                </a:solidFill>
+                <a:latin typeface="+mj-lt"/>
+                <a:cs typeface="Courier New" panose="02070309020205020404" pitchFamily="49" charset="0"/>
+              </a:rPr>
+              <a:t>Add </a:t>
+            </a:r>
+            <a:r>
+              <a:rPr lang="en-US" sz="2800" dirty="0" err="1">
+                <a:solidFill>
+                  <a:schemeClr val="accent1"/>
+                </a:solidFill>
+                <a:latin typeface="+mj-lt"/>
+                <a:cs typeface="Courier New" panose="02070309020205020404" pitchFamily="49" charset="0"/>
+              </a:rPr>
+              <a:t>set_friends</a:t>
+            </a:r>
+            <a:r>
+              <a:rPr lang="en-US" sz="2800" dirty="0">
+                <a:solidFill>
+                  <a:schemeClr val="accent1"/>
+                </a:solidFill>
+                <a:latin typeface="+mj-lt"/>
+                <a:cs typeface="Courier New" panose="02070309020205020404" pitchFamily="49" charset="0"/>
+              </a:rPr>
+              <a:t>(), </a:t>
+            </a:r>
+            <a:r>
+              <a:rPr lang="en-US" sz="2800" dirty="0" err="1">
+                <a:solidFill>
+                  <a:schemeClr val="accent1"/>
+                </a:solidFill>
+                <a:latin typeface="+mj-lt"/>
+                <a:cs typeface="Courier New" panose="02070309020205020404" pitchFamily="49" charset="0"/>
+              </a:rPr>
+              <a:t>add_friend</a:t>
+            </a:r>
+            <a:r>
+              <a:rPr lang="en-US" sz="2800" dirty="0">
+                <a:solidFill>
+                  <a:schemeClr val="accent1"/>
+                </a:solidFill>
+                <a:latin typeface="+mj-lt"/>
+                <a:cs typeface="Courier New" panose="02070309020205020404" pitchFamily="49" charset="0"/>
+              </a:rPr>
+              <a:t>()</a:t>
             </a:r>
           </a:p>
           <a:p>
@@ -14982,6 +15055,21 @@
                 <a:cs typeface="Courier New" panose="02070309020205020404" pitchFamily="49" charset="0"/>
               </a:rPr>
               <a:t>g. Use expanded friends  module</a:t>
+            </a:r>
+          </a:p>
+          <a:p>
+            <a:pPr marL="1257300" lvl="3" indent="0">
+              <a:buNone/>
+            </a:pPr>
+            <a:r>
+              <a:rPr lang="en-US" sz="2800" dirty="0">
+                <a:solidFill>
+                  <a:schemeClr val="accent1"/>
+                </a:solidFill>
+                <a:latin typeface="+mj-lt"/>
+                <a:cs typeface="Courier New" panose="02070309020205020404" pitchFamily="49" charset="0"/>
+              </a:rPr>
+              <a:t>friends_mod_use.py</a:t>
             </a:r>
           </a:p>
           <a:p>
@@ -15115,7 +15203,7 @@
                 <a:tabLst/>
                 <a:defRPr/>
               </a:pPr>
-              <a:t>7/3/2022</a:t>
+              <a:t>7/13/2022</a:t>
             </a:fld>
             <a:endParaRPr kumimoji="0" lang="en-US" sz="900" b="0" i="0" u="none" strike="noStrike" kern="1200" cap="none" spc="0" normalizeH="0" baseline="0" noProof="0" dirty="0">
               <a:ln>
@@ -15305,13 +15393,13 @@
   <p:clrMapOvr>
     <a:masterClrMapping/>
   </p:clrMapOvr>
-  <mc:AlternateContent xmlns:mc="http://schemas.openxmlformats.org/markup-compatibility/2006">
-    <mc:Choice xmlns:p14="http://schemas.microsoft.com/office/powerpoint/2010/main" Requires="p14">
+  <mc:AlternateContent xmlns:mc="http://schemas.openxmlformats.org/markup-compatibility/2006" xmlns:p14="http://schemas.microsoft.com/office/powerpoint/2010/main">
+    <mc:Choice Requires="p14">
       <p:transition spd="med" p14:dur="700">
         <p:fade/>
       </p:transition>
     </mc:Choice>
-    <mc:Fallback>
+    <mc:Fallback xmlns="">
       <p:transition spd="med">
         <p:fade/>
       </p:transition>
@@ -15361,11 +15449,7 @@
           <a:lstStyle/>
           <a:p>
             <a:r>
-              <a:rPr lang="en-US" dirty="0"/>
-              <a:t>Functions </a:t>
-            </a:r>
-            <a:r>
-              <a:rPr kumimoji="0" lang="en-US" sz="2400" b="0" i="0" u="none" strike="noStrike" kern="1200" cap="none" spc="0" normalizeH="0" baseline="0" noProof="0" dirty="0">
+              <a:rPr kumimoji="0" lang="en-US" b="0" i="0" u="none" strike="noStrike" kern="1200" cap="none" spc="0" normalizeH="0" baseline="0" noProof="0" dirty="0">
                 <a:ln>
                   <a:noFill/>
                 </a:ln>
@@ -15379,9 +15463,9 @@
                 <a:ea typeface="+mj-ea"/>
                 <a:cs typeface="+mj-cs"/>
               </a:rPr>
-              <a:t>(as well as other stuff)</a:t>
-            </a:r>
-            <a:r>
+              <a:t>Help / Info</a:t>
+            </a:r>
+            <a:br>
               <a:rPr kumimoji="0" lang="en-US" b="0" i="0" u="none" strike="noStrike" kern="1200" cap="none" spc="0" normalizeH="0" baseline="0" noProof="0" dirty="0">
                 <a:ln>
                   <a:noFill/>
@@ -15396,9 +15480,25 @@
                 <a:ea typeface="+mj-ea"/>
                 <a:cs typeface="+mj-cs"/>
               </a:rPr>
-              <a:t> Help / Info</a:t>
-            </a:r>
-            <a:endParaRPr lang="en-US" dirty="0"/>
+            </a:br>
+            <a:r>
+              <a:rPr kumimoji="0" lang="en-US" sz="3200" b="0" i="0" u="none" strike="noStrike" kern="1200" cap="none" spc="0" normalizeH="0" baseline="0" noProof="0" dirty="0">
+                <a:ln>
+                  <a:noFill/>
+                </a:ln>
+                <a:solidFill>
+                  <a:srgbClr val="90C226"/>
+                </a:solidFill>
+                <a:effectLst/>
+                <a:uLnTx/>
+                <a:uFillTx/>
+                <a:latin typeface="Trebuchet MS" panose="020B0603020202020204"/>
+                <a:ea typeface="+mj-ea"/>
+                <a:cs typeface="+mj-cs"/>
+              </a:rPr>
+              <a:t>on Functions plus Other Stuff</a:t>
+            </a:r>
+            <a:endParaRPr lang="en-US" sz="3200" dirty="0"/>
           </a:p>
         </p:txBody>
       </p:sp>
@@ -15421,13 +15521,11 @@
         <p:spPr/>
         <p:txBody>
           <a:bodyPr>
-            <a:normAutofit fontScale="92500" lnSpcReduction="20000"/>
+            <a:normAutofit fontScale="85000" lnSpcReduction="10000"/>
           </a:bodyPr>
           <a:lstStyle/>
           <a:p>
-            <a:pPr marL="800100" lvl="2" indent="0">
-              <a:buNone/>
-            </a:pPr>
+            <a:pPr marL="1257300" lvl="2" indent="-457200"/>
             <a:r>
               <a:rPr lang="en-US" sz="3000" dirty="0">
                 <a:latin typeface="+mj-lt"/>
@@ -15437,17 +15535,29 @@
             </a:r>
           </a:p>
           <a:p>
-            <a:pPr marL="1714500" lvl="3" indent="-457200"/>
+            <a:pPr marL="1257300" lvl="2" indent="-457200"/>
+            <a:r>
+              <a:rPr lang="en-US" sz="3000" dirty="0">
+                <a:latin typeface="+mj-lt"/>
+                <a:cs typeface="Courier New" panose="02070309020205020404" pitchFamily="49" charset="0"/>
+              </a:rPr>
+              <a:t>       Python Tutorial:</a:t>
+            </a:r>
+          </a:p>
+          <a:p>
+            <a:pPr marL="1257300" lvl="3" indent="0">
+              <a:buNone/>
+            </a:pPr>
             <a:r>
               <a:rPr lang="en-US" sz="2800" dirty="0">
                 <a:latin typeface="+mj-lt"/>
                 <a:cs typeface="Courier New" panose="02070309020205020404" pitchFamily="49" charset="0"/>
               </a:rPr>
-              <a:t>       Python Tutorial:</a:t>
-            </a:r>
-          </a:p>
-          <a:p>
-            <a:pPr marL="1714500" lvl="4" indent="0">
+              <a:t>           4.6. Defining Functions</a:t>
+            </a:r>
+          </a:p>
+          <a:p>
+            <a:pPr marL="1257300" lvl="3" indent="0">
               <a:buNone/>
             </a:pPr>
             <a:r>
@@ -15455,11 +15565,11 @@
                 <a:latin typeface="+mj-lt"/>
                 <a:cs typeface="Courier New" panose="02070309020205020404" pitchFamily="49" charset="0"/>
               </a:rPr>
-              <a:t>           4.6. Defining Functions</a:t>
-            </a:r>
-          </a:p>
-          <a:p>
-            <a:pPr marL="1714500" lvl="4" indent="0">
+              <a:t>           4.7. More on Defining Functions</a:t>
+            </a:r>
+          </a:p>
+          <a:p>
+            <a:pPr marL="1257300" lvl="3" indent="0">
               <a:buNone/>
             </a:pPr>
             <a:r>
@@ -15467,46 +15577,34 @@
                 <a:latin typeface="+mj-lt"/>
                 <a:cs typeface="Courier New" panose="02070309020205020404" pitchFamily="49" charset="0"/>
               </a:rPr>
-              <a:t>           4.7. More on Defining Functions</a:t>
-            </a:r>
-          </a:p>
-          <a:p>
-            <a:pPr marL="1714500" lvl="4" indent="0">
-              <a:buNone/>
-            </a:pPr>
-            <a:r>
-              <a:rPr lang="en-US" sz="2800" dirty="0">
+              <a:t>           4.7.2. Keyword Arguments</a:t>
+            </a:r>
+          </a:p>
+          <a:p>
+            <a:pPr marL="1257300" lvl="2" indent="-457200"/>
+            <a:r>
+              <a:rPr lang="en-US" sz="3000" dirty="0">
                 <a:latin typeface="+mj-lt"/>
                 <a:cs typeface="Courier New" panose="02070309020205020404" pitchFamily="49" charset="0"/>
               </a:rPr>
-              <a:t>           4.7.2. Keyword Arguments</a:t>
-            </a:r>
-          </a:p>
-          <a:p>
-            <a:pPr marL="1714500" lvl="3" indent="-457200"/>
-            <a:r>
-              <a:rPr lang="en-US" sz="2800" dirty="0">
-                <a:latin typeface="+mj-lt"/>
-                <a:cs typeface="Courier New" panose="02070309020205020404" pitchFamily="49" charset="0"/>
-              </a:rPr>
               <a:t>       The Python Language Reference</a:t>
             </a:r>
           </a:p>
           <a:p>
-            <a:pPr marL="1257300" lvl="2" indent="-457200"/>
-            <a:endParaRPr lang="en-US" sz="3000" dirty="0">
+            <a:pPr marL="857250" lvl="1" indent="-457200"/>
+            <a:endParaRPr lang="en-US" sz="3200" dirty="0">
               <a:latin typeface="+mj-lt"/>
               <a:cs typeface="Courier New" panose="02070309020205020404" pitchFamily="49" charset="0"/>
             </a:endParaRPr>
           </a:p>
           <a:p>
-            <a:pPr marL="1257300" lvl="2" indent="-457200"/>
-            <a:r>
-              <a:rPr lang="en-US" sz="3000" dirty="0">
+            <a:pPr marL="857250" lvl="1" indent="-457200"/>
+            <a:r>
+              <a:rPr lang="en-US" sz="3200" dirty="0">
                 <a:latin typeface="+mj-lt"/>
                 <a:cs typeface="Courier New" panose="02070309020205020404" pitchFamily="49" charset="0"/>
               </a:rPr>
-              <a:t>  https://www.w3schools.com/python</a:t>
+              <a:t>  Online - https://www.w3schools.com/python</a:t>
             </a:r>
           </a:p>
           <a:p>
@@ -15595,7 +15693,7 @@
                 <a:tabLst/>
                 <a:defRPr/>
               </a:pPr>
-              <a:t>7/3/2022</a:t>
+              <a:t>7/13/2022</a:t>
             </a:fld>
             <a:endParaRPr kumimoji="0" lang="en-US" sz="900" b="0" i="0" u="none" strike="noStrike" kern="1200" cap="none" spc="0" normalizeH="0" baseline="0" noProof="0" dirty="0">
               <a:ln>
@@ -15785,13 +15883,13 @@
   <p:clrMapOvr>
     <a:masterClrMapping/>
   </p:clrMapOvr>
-  <mc:AlternateContent xmlns:mc="http://schemas.openxmlformats.org/markup-compatibility/2006">
-    <mc:Choice xmlns:p14="http://schemas.microsoft.com/office/powerpoint/2010/main" Requires="p14">
+  <mc:AlternateContent xmlns:mc="http://schemas.openxmlformats.org/markup-compatibility/2006" xmlns:p14="http://schemas.microsoft.com/office/powerpoint/2010/main">
+    <mc:Choice Requires="p14">
       <p:transition spd="med" p14:dur="700">
         <p:fade/>
       </p:transition>
     </mc:Choice>
-    <mc:Fallback>
+    <mc:Fallback xmlns="">
       <p:transition spd="med">
         <p:fade/>
       </p:transition>
@@ -16018,7 +16116,7 @@
                 <a:tabLst/>
                 <a:defRPr/>
               </a:pPr>
-              <a:t>7/3/2022</a:t>
+              <a:t>7/13/2022</a:t>
             </a:fld>
             <a:endParaRPr kumimoji="0" lang="en-US" sz="900" b="0" i="0" u="none" strike="noStrike" kern="1200" cap="none" spc="0" normalizeH="0" baseline="0" noProof="0" dirty="0">
               <a:ln>

</xml_diff>

<commit_message>
Update based on class
</commit_message>
<xml_diff>
--- a/presentation/Class_3_Functions_Why_and_How/Class_3_Functions_Why_and_How.pptx
+++ b/presentation/Class_3_Functions_Why_and_How/Class_3_Functions_Why_and_How.pptx
@@ -228,7 +228,7 @@
           <a:p>
             <a:fld id="{2F2D3CE1-F05B-4C3D-9D5C-72AEEB268A38}" type="datetimeFigureOut">
               <a:rPr lang="en-US" smtClean="0"/>
-              <a:t>8/9/2022</a:t>
+              <a:t>9/21/2022</a:t>
             </a:fld>
             <a:endParaRPr lang="en-US"/>
           </a:p>
@@ -405,7 +405,7 @@
           <a:p>
             <a:fld id="{13370B23-86E2-4053-8EEB-332AC694C455}" type="datetimeFigureOut">
               <a:rPr lang="en-US" smtClean="0"/>
-              <a:t>8/9/2022</a:t>
+              <a:t>9/21/2022</a:t>
             </a:fld>
             <a:endParaRPr lang="en-US"/>
           </a:p>
@@ -836,7 +836,7 @@
                 <a:tabLst/>
                 <a:defRPr/>
               </a:pPr>
-              <a:t>8/9/2022</a:t>
+              <a:t>9/21/2022</a:t>
             </a:fld>
             <a:endParaRPr kumimoji="0" lang="en-US" sz="1200" b="0" i="0" u="none" strike="noStrike" kern="1200" cap="none" spc="0" normalizeH="0" baseline="0" noProof="0" dirty="0">
               <a:ln>
@@ -1192,7 +1192,7 @@
                 <a:tabLst/>
                 <a:defRPr/>
               </a:pPr>
-              <a:t>8/9/2022</a:t>
+              <a:t>9/21/2022</a:t>
             </a:fld>
             <a:endParaRPr kumimoji="0" lang="en-US" sz="1200" b="0" i="0" u="none" strike="noStrike" kern="1200" cap="none" spc="0" normalizeH="0" baseline="0" noProof="0" dirty="0">
               <a:ln>
@@ -1541,7 +1541,7 @@
                 <a:tabLst/>
                 <a:defRPr/>
               </a:pPr>
-              <a:t>8/9/2022</a:t>
+              <a:t>9/21/2022</a:t>
             </a:fld>
             <a:endParaRPr kumimoji="0" lang="en-US" sz="1200" b="0" i="0" u="none" strike="noStrike" kern="1200" cap="none" spc="0" normalizeH="0" baseline="0" noProof="0" dirty="0">
               <a:ln>
@@ -1887,7 +1887,7 @@
                 <a:tabLst/>
                 <a:defRPr/>
               </a:pPr>
-              <a:t>8/9/2022</a:t>
+              <a:t>9/21/2022</a:t>
             </a:fld>
             <a:endParaRPr kumimoji="0" lang="en-US" sz="1200" b="0" i="0" u="none" strike="noStrike" kern="1200" cap="none" spc="0" normalizeH="0" baseline="0" noProof="0" dirty="0">
               <a:ln>
@@ -2218,7 +2218,7 @@
                 <a:tabLst/>
                 <a:defRPr/>
               </a:pPr>
-              <a:t>8/9/2022</a:t>
+              <a:t>9/21/2022</a:t>
             </a:fld>
             <a:endParaRPr kumimoji="0" lang="en-US" sz="1200" b="0" i="0" u="none" strike="noStrike" kern="1200" cap="none" spc="0" normalizeH="0" baseline="0" noProof="0" dirty="0">
               <a:ln>
@@ -2558,7 +2558,7 @@
                 <a:tabLst/>
                 <a:defRPr/>
               </a:pPr>
-              <a:t>8/9/2022</a:t>
+              <a:t>9/21/2022</a:t>
             </a:fld>
             <a:endParaRPr kumimoji="0" lang="en-US" sz="1200" b="0" i="0" u="none" strike="noStrike" kern="1200" cap="none" spc="0" normalizeH="0" baseline="0" noProof="0" dirty="0">
               <a:ln>
@@ -2898,7 +2898,7 @@
                 <a:tabLst/>
                 <a:defRPr/>
               </a:pPr>
-              <a:t>8/9/2022</a:t>
+              <a:t>9/21/2022</a:t>
             </a:fld>
             <a:endParaRPr kumimoji="0" lang="en-US" sz="1200" b="0" i="0" u="none" strike="noStrike" kern="1200" cap="none" spc="0" normalizeH="0" baseline="0" noProof="0" dirty="0">
               <a:ln>
@@ -3238,7 +3238,7 @@
                 <a:tabLst/>
                 <a:defRPr/>
               </a:pPr>
-              <a:t>8/9/2022</a:t>
+              <a:t>9/21/2022</a:t>
             </a:fld>
             <a:endParaRPr kumimoji="0" lang="en-US" sz="1200" b="0" i="0" u="none" strike="noStrike" kern="1200" cap="none" spc="0" normalizeH="0" baseline="0" noProof="0" dirty="0">
               <a:ln>
@@ -3578,7 +3578,7 @@
                 <a:tabLst/>
                 <a:defRPr/>
               </a:pPr>
-              <a:t>8/9/2022</a:t>
+              <a:t>9/21/2022</a:t>
             </a:fld>
             <a:endParaRPr kumimoji="0" lang="en-US" sz="1200" b="0" i="0" u="none" strike="noStrike" kern="1200" cap="none" spc="0" normalizeH="0" baseline="0" noProof="0" dirty="0">
               <a:ln>
@@ -3912,7 +3912,7 @@
                 <a:tabLst/>
                 <a:defRPr/>
               </a:pPr>
-              <a:t>8/9/2022</a:t>
+              <a:t>9/21/2022</a:t>
             </a:fld>
             <a:endParaRPr kumimoji="0" lang="en-US" sz="1200" b="0" i="0" u="none" strike="noStrike" kern="1200" cap="none" spc="0" normalizeH="0" baseline="0" noProof="0" dirty="0">
               <a:ln>
@@ -4268,7 +4268,7 @@
                 <a:tabLst/>
                 <a:defRPr/>
               </a:pPr>
-              <a:t>8/9/2022</a:t>
+              <a:t>9/21/2022</a:t>
             </a:fld>
             <a:endParaRPr kumimoji="0" lang="en-US" sz="1200" b="0" i="0" u="none" strike="noStrike" kern="1200" cap="none" spc="0" normalizeH="0" baseline="0" noProof="0" dirty="0">
               <a:ln>
@@ -5157,7 +5157,7 @@
           <a:p>
             <a:fld id="{B1DF5501-EE91-4443-9D3B-24E6F28D34E2}" type="datetime1">
               <a:rPr lang="en-US" smtClean="0"/>
-              <a:t>8/9/2022</a:t>
+              <a:t>9/21/2022</a:t>
             </a:fld>
             <a:endParaRPr lang="en-US" dirty="0"/>
           </a:p>
@@ -5431,7 +5431,7 @@
           <a:p>
             <a:fld id="{E954E1E9-8456-43AD-BA28-861520D256B9}" type="datetime1">
               <a:rPr lang="en-US" smtClean="0"/>
-              <a:t>8/9/2022</a:t>
+              <a:t>9/21/2022</a:t>
             </a:fld>
             <a:endParaRPr lang="en-US" dirty="0"/>
           </a:p>
@@ -5757,7 +5757,7 @@
           <a:p>
             <a:fld id="{FAF31E0C-AAFD-4E63-B3AE-16CD757951F4}" type="datetime1">
               <a:rPr lang="en-US" smtClean="0"/>
-              <a:t>8/9/2022</a:t>
+              <a:t>9/21/2022</a:t>
             </a:fld>
             <a:endParaRPr lang="en-US" dirty="0"/>
           </a:p>
@@ -6110,7 +6110,7 @@
           <a:p>
             <a:fld id="{000084FF-4715-4B6E-BD22-453621E5873F}" type="datetime1">
               <a:rPr lang="en-US" smtClean="0"/>
-              <a:t>8/9/2022</a:t>
+              <a:t>9/21/2022</a:t>
             </a:fld>
             <a:endParaRPr lang="en-US" dirty="0"/>
           </a:p>
@@ -6436,7 +6436,7 @@
           <a:p>
             <a:fld id="{6AC37F8D-4DF5-4AB6-A766-5A84B3D74A3B}" type="datetime1">
               <a:rPr lang="en-US" smtClean="0"/>
-              <a:t>8/9/2022</a:t>
+              <a:t>9/21/2022</a:t>
             </a:fld>
             <a:endParaRPr lang="en-US" dirty="0"/>
           </a:p>
@@ -6841,7 +6841,7 @@
           <a:p>
             <a:fld id="{1BF3CD1A-162D-40B2-9B22-9056F77C27F2}" type="datetime1">
               <a:rPr lang="en-US" smtClean="0"/>
-              <a:t>8/9/2022</a:t>
+              <a:t>9/21/2022</a:t>
             </a:fld>
             <a:endParaRPr lang="en-US" dirty="0"/>
           </a:p>
@@ -7023,7 +7023,7 @@
           <a:p>
             <a:fld id="{D42E4200-B1E5-4E39-8279-05DD69810A37}" type="datetime1">
               <a:rPr lang="en-US" smtClean="0"/>
-              <a:t>8/9/2022</a:t>
+              <a:t>9/21/2022</a:t>
             </a:fld>
             <a:endParaRPr lang="en-US" dirty="0"/>
           </a:p>
@@ -7214,7 +7214,7 @@
           <a:p>
             <a:fld id="{47CF7895-00AC-42E5-9790-7B0E3CE09DF2}" type="datetime1">
               <a:rPr lang="en-US" smtClean="0"/>
-              <a:t>8/9/2022</a:t>
+              <a:t>9/21/2022</a:t>
             </a:fld>
             <a:endParaRPr lang="en-US" dirty="0"/>
           </a:p>
@@ -7405,7 +7405,7 @@
           <a:p>
             <a:fld id="{059A67F1-3EA0-4026-BE6A-31EE4E1B1DB5}" type="datetime1">
               <a:rPr lang="en-US" smtClean="0"/>
-              <a:t>8/9/2022</a:t>
+              <a:t>9/21/2022</a:t>
             </a:fld>
             <a:endParaRPr lang="en-US" dirty="0"/>
           </a:p>
@@ -7689,7 +7689,7 @@
           <a:p>
             <a:fld id="{3F9A13D6-B8C2-463B-B3F7-C62E098B328E}" type="datetime1">
               <a:rPr lang="en-US" smtClean="0"/>
-              <a:t>8/9/2022</a:t>
+              <a:t>9/21/2022</a:t>
             </a:fld>
             <a:endParaRPr lang="en-US" dirty="0"/>
           </a:p>
@@ -7932,7 +7932,7 @@
           <a:p>
             <a:fld id="{D2B63420-31EE-4E4B-911C-2601B14D9FDD}" type="datetime1">
               <a:rPr lang="en-US" smtClean="0"/>
-              <a:t>8/9/2022</a:t>
+              <a:t>9/21/2022</a:t>
             </a:fld>
             <a:endParaRPr lang="en-US" dirty="0"/>
           </a:p>
@@ -8317,7 +8317,7 @@
           <a:p>
             <a:fld id="{2DD8986D-86F8-41E6-8CFF-8C91AEF92622}" type="datetime1">
               <a:rPr lang="en-US" smtClean="0"/>
-              <a:t>8/9/2022</a:t>
+              <a:t>9/21/2022</a:t>
             </a:fld>
             <a:endParaRPr lang="en-US" dirty="0"/>
           </a:p>
@@ -8451,7 +8451,7 @@
           <a:p>
             <a:fld id="{BA885161-032E-4C6A-8EDA-39D168DF18E4}" type="datetime1">
               <a:rPr lang="en-US" smtClean="0"/>
-              <a:t>8/9/2022</a:t>
+              <a:t>9/21/2022</a:t>
             </a:fld>
             <a:endParaRPr lang="en-US" dirty="0"/>
           </a:p>
@@ -8557,7 +8557,7 @@
           <a:p>
             <a:fld id="{958E6740-E523-48D9-9C4E-6F218E87BAF3}" type="datetime1">
               <a:rPr lang="en-US" smtClean="0"/>
-              <a:t>8/9/2022</a:t>
+              <a:t>9/21/2022</a:t>
             </a:fld>
             <a:endParaRPr lang="en-US" dirty="0"/>
           </a:p>
@@ -8823,7 +8823,7 @@
           <a:p>
             <a:fld id="{6121D4CA-FF09-4CB8-8D51-2613D19A0F2E}" type="datetime1">
               <a:rPr lang="en-US" smtClean="0"/>
-              <a:t>8/9/2022</a:t>
+              <a:t>9/21/2022</a:t>
             </a:fld>
             <a:endParaRPr lang="en-US" dirty="0"/>
           </a:p>
@@ -9096,7 +9096,7 @@
           <a:p>
             <a:fld id="{8C4779EA-AEA7-43B3-9B65-A77E9A890421}" type="datetime1">
               <a:rPr lang="en-US" smtClean="0"/>
-              <a:t>8/9/2022</a:t>
+              <a:t>9/21/2022</a:t>
             </a:fld>
             <a:endParaRPr lang="en-US" dirty="0"/>
           </a:p>
@@ -9849,7 +9849,7 @@
           <a:p>
             <a:fld id="{059A67F1-3EA0-4026-BE6A-31EE4E1B1DB5}" type="datetime1">
               <a:rPr lang="en-US" smtClean="0"/>
-              <a:t>8/9/2022</a:t>
+              <a:t>9/21/2022</a:t>
             </a:fld>
             <a:endParaRPr lang="en-US" dirty="0"/>
           </a:p>
@@ -10626,7 +10626,7 @@
                 <a:tabLst/>
                 <a:defRPr/>
               </a:pPr>
-              <a:t>8/9/2022</a:t>
+              <a:t>9/21/2022</a:t>
             </a:fld>
             <a:endParaRPr kumimoji="0" lang="en-US" sz="900" b="0" i="0" u="none" strike="noStrike" kern="1200" cap="none" spc="0" normalizeH="0" baseline="0" noProof="0" dirty="0">
               <a:ln>
@@ -11270,7 +11270,7 @@
                 <a:tabLst/>
                 <a:defRPr/>
               </a:pPr>
-              <a:t>8/9/2022</a:t>
+              <a:t>9/21/2022</a:t>
             </a:fld>
             <a:endParaRPr kumimoji="0" lang="en-US" sz="900" b="0" i="0" u="none" strike="noStrike" kern="1200" cap="none" spc="0" normalizeH="0" baseline="0" noProof="0" dirty="0">
               <a:ln>
@@ -11658,7 +11658,7 @@
                 <a:tabLst/>
                 <a:defRPr/>
               </a:pPr>
-              <a:t>8/9/2022</a:t>
+              <a:t>9/21/2022</a:t>
             </a:fld>
             <a:endParaRPr kumimoji="0" lang="en-US" sz="900" b="0" i="0" u="none" strike="noStrike" kern="1200" cap="none" spc="0" normalizeH="0" baseline="0" noProof="0" dirty="0">
               <a:ln>
@@ -11977,7 +11977,7 @@
           <a:p>
             <a:fld id="{A7119916-CD40-456D-ABE3-55F8822671F7}" type="datetime1">
               <a:rPr lang="en-US" smtClean="0"/>
-              <a:t>8/9/2022</a:t>
+              <a:t>9/21/2022</a:t>
             </a:fld>
             <a:endParaRPr lang="en-US" dirty="0"/>
           </a:p>
@@ -12329,7 +12329,7 @@
           <a:p>
             <a:fld id="{A7119916-CD40-456D-ABE3-55F8822671F7}" type="datetime1">
               <a:rPr lang="en-US" smtClean="0"/>
-              <a:t>8/9/2022</a:t>
+              <a:t>9/21/2022</a:t>
             </a:fld>
             <a:endParaRPr lang="en-US" dirty="0"/>
           </a:p>
@@ -12545,7 +12545,7 @@
                 <a:tabLst/>
                 <a:defRPr/>
               </a:pPr>
-              <a:t>8/9/2022</a:t>
+              <a:t>9/21/2022</a:t>
             </a:fld>
             <a:endParaRPr kumimoji="0" lang="en-US" sz="900" b="0" i="0" u="none" strike="noStrike" kern="1200" cap="none" spc="0" normalizeH="0" baseline="0" noProof="0" dirty="0">
               <a:ln>
@@ -12857,7 +12857,7 @@
           <a:p>
             <a:fld id="{A7119916-CD40-456D-ABE3-55F8822671F7}" type="datetime1">
               <a:rPr lang="en-US" smtClean="0"/>
-              <a:t>8/9/2022</a:t>
+              <a:t>9/21/2022</a:t>
             </a:fld>
             <a:endParaRPr lang="en-US" dirty="0"/>
           </a:p>
@@ -13188,7 +13188,7 @@
                 <a:tabLst/>
                 <a:defRPr/>
               </a:pPr>
-              <a:t>8/9/2022</a:t>
+              <a:t>9/21/2022</a:t>
             </a:fld>
             <a:endParaRPr kumimoji="0" lang="en-US" sz="900" b="0" i="0" u="none" strike="noStrike" kern="1200" cap="none" spc="0" normalizeH="0" baseline="0" noProof="0" dirty="0">
               <a:ln>
@@ -13725,7 +13725,7 @@
                 <a:tabLst/>
                 <a:defRPr/>
               </a:pPr>
-              <a:t>8/9/2022</a:t>
+              <a:t>9/21/2022</a:t>
             </a:fld>
             <a:endParaRPr kumimoji="0" lang="en-US" sz="900" b="0" i="0" u="none" strike="noStrike" kern="1200" cap="none" spc="0" normalizeH="0" baseline="0" noProof="0" dirty="0">
               <a:ln>
@@ -14172,7 +14172,7 @@
                 <a:tabLst/>
                 <a:defRPr/>
               </a:pPr>
-              <a:t>8/9/2022</a:t>
+              <a:t>9/21/2022</a:t>
             </a:fld>
             <a:endParaRPr kumimoji="0" lang="en-US" sz="900" b="0" i="0" u="none" strike="noStrike" kern="1200" cap="none" spc="0" normalizeH="0" baseline="0" noProof="0" dirty="0">
               <a:ln>
@@ -14680,7 +14680,7 @@
                 <a:tabLst/>
                 <a:defRPr/>
               </a:pPr>
-              <a:t>8/9/2022</a:t>
+              <a:t>9/21/2022</a:t>
             </a:fld>
             <a:endParaRPr kumimoji="0" lang="en-US" sz="900" b="0" i="0" u="none" strike="noStrike" kern="1200" cap="none" spc="0" normalizeH="0" baseline="0" noProof="0" dirty="0">
               <a:ln>
@@ -14997,47 +14997,7 @@
                 <a:latin typeface="+mj-lt"/>
                 <a:cs typeface="Courier New" panose="02070309020205020404" pitchFamily="49" charset="0"/>
               </a:rPr>
-              <a:t>Add </a:t>
-            </a:r>
-            <a:r>
-              <a:rPr lang="en-US" sz="2800" dirty="0" err="1">
-                <a:solidFill>
-                  <a:schemeClr val="accent1"/>
-                </a:solidFill>
-                <a:latin typeface="+mj-lt"/>
-                <a:cs typeface="Courier New" panose="02070309020205020404" pitchFamily="49" charset="0"/>
-              </a:rPr>
-              <a:t>set_friends</a:t>
-            </a:r>
-            <a:r>
-              <a:rPr lang="en-US" sz="2800" dirty="0">
-                <a:solidFill>
-                  <a:schemeClr val="accent1"/>
-                </a:solidFill>
-                <a:latin typeface="+mj-lt"/>
-                <a:cs typeface="Courier New" panose="02070309020205020404" pitchFamily="49" charset="0"/>
-              </a:rPr>
-              <a:t>(), </a:t>
-            </a:r>
-            <a:r>
-              <a:rPr lang="en-US" sz="2800" dirty="0" err="1">
-                <a:solidFill>
-                  <a:schemeClr val="accent1"/>
-                </a:solidFill>
-                <a:latin typeface="+mj-lt"/>
-                <a:cs typeface="Courier New" panose="02070309020205020404" pitchFamily="49" charset="0"/>
-              </a:rPr>
-              <a:t>add_friend</a:t>
-            </a:r>
-            <a:r>
-              <a:rPr lang="en-US" sz="2800" dirty="0">
-                <a:solidFill>
-                  <a:schemeClr val="accent1"/>
-                </a:solidFill>
-                <a:latin typeface="+mj-lt"/>
-                <a:cs typeface="Courier New" panose="02070309020205020404" pitchFamily="49" charset="0"/>
-              </a:rPr>
-              <a:t>()</a:t>
+              <a:t>Add set_friends(), add_friend()</a:t>
             </a:r>
           </a:p>
           <a:p>
@@ -15217,7 +15177,7 @@
                 <a:tabLst/>
                 <a:defRPr/>
               </a:pPr>
-              <a:t>8/9/2022</a:t>
+              <a:t>9/21/2022</a:t>
             </a:fld>
             <a:endParaRPr kumimoji="0" lang="en-US" sz="900" b="0" i="0" u="none" strike="noStrike" kern="1200" cap="none" spc="0" normalizeH="0" baseline="0" noProof="0" dirty="0">
               <a:ln>
@@ -15721,7 +15681,7 @@
                 <a:tabLst/>
                 <a:defRPr/>
               </a:pPr>
-              <a:t>8/9/2022</a:t>
+              <a:t>9/21/2022</a:t>
             </a:fld>
             <a:endParaRPr kumimoji="0" lang="en-US" sz="900" b="0" i="0" u="none" strike="noStrike" kern="1200" cap="none" spc="0" normalizeH="0" baseline="0" noProof="0" dirty="0">
               <a:ln>
@@ -16144,7 +16104,7 @@
                 <a:tabLst/>
                 <a:defRPr/>
               </a:pPr>
-              <a:t>8/9/2022</a:t>
+              <a:t>9/21/2022</a:t>
             </a:fld>
             <a:endParaRPr kumimoji="0" lang="en-US" sz="900" b="0" i="0" u="none" strike="noStrike" kern="1200" cap="none" spc="0" normalizeH="0" baseline="0" noProof="0" dirty="0">
               <a:ln>

</xml_diff>